<commit_message>
Updated presentation to correct typos
</commit_message>
<xml_diff>
--- a/presentation/Build-a-Cell-Presentation.pptx
+++ b/presentation/Build-a-Cell-Presentation.pptx
@@ -5,17 +5,16 @@
     <p:sldMasterId id="2147483648" r:id="rId1"/>
   </p:sldMasterIdLst>
   <p:notesMasterIdLst>
-    <p:notesMasterId r:id="rId10"/>
+    <p:notesMasterId r:id="rId9"/>
   </p:notesMasterIdLst>
   <p:sldIdLst>
     <p:sldId id="271" r:id="rId2"/>
     <p:sldId id="272" r:id="rId3"/>
     <p:sldId id="267" r:id="rId4"/>
     <p:sldId id="262" r:id="rId5"/>
-    <p:sldId id="273" r:id="rId6"/>
-    <p:sldId id="265" r:id="rId7"/>
-    <p:sldId id="268" r:id="rId8"/>
-    <p:sldId id="269" r:id="rId9"/>
+    <p:sldId id="265" r:id="rId6"/>
+    <p:sldId id="268" r:id="rId7"/>
+    <p:sldId id="269" r:id="rId8"/>
   </p:sldIdLst>
   <p:sldSz cx="12192000" cy="6858000"/>
   <p:notesSz cx="6858000" cy="9144000"/>
@@ -204,7 +203,7 @@
           <a:p>
             <a:fld id="{7A6C2452-6E74-BB46-BF3A-CA25C2FACA65}" type="datetimeFigureOut">
               <a:rPr lang="en-US" smtClean="0"/>
-              <a:t>10/28/2024</a:t>
+              <a:t>11/3/2024</a:t>
             </a:fld>
             <a:endParaRPr lang="en-US"/>
           </a:p>
@@ -618,7 +617,7 @@
           <a:p>
             <a:fld id="{161707FA-2BC7-024D-8E63-A57F6DC8E546}" type="datetime1">
               <a:rPr lang="en-US" smtClean="0"/>
-              <a:t>10/28/2024</a:t>
+              <a:t>11/3/2024</a:t>
             </a:fld>
             <a:endParaRPr lang="en-US"/>
           </a:p>
@@ -816,7 +815,7 @@
           <a:p>
             <a:fld id="{9469C222-3C23-844B-A32B-243452935EFB}" type="datetime1">
               <a:rPr lang="en-US" smtClean="0"/>
-              <a:t>10/28/2024</a:t>
+              <a:t>11/3/2024</a:t>
             </a:fld>
             <a:endParaRPr lang="en-US"/>
           </a:p>
@@ -1024,7 +1023,7 @@
           <a:p>
             <a:fld id="{53D062B6-D43E-DF4B-B42F-18FB3930DBD4}" type="datetime1">
               <a:rPr lang="en-US" smtClean="0"/>
-              <a:t>10/28/2024</a:t>
+              <a:t>11/3/2024</a:t>
             </a:fld>
             <a:endParaRPr lang="en-US"/>
           </a:p>
@@ -1222,7 +1221,7 @@
           <a:p>
             <a:fld id="{FBB81587-3753-AE40-9623-50B0634BC3B6}" type="datetime1">
               <a:rPr lang="en-US" smtClean="0"/>
-              <a:t>10/28/2024</a:t>
+              <a:t>11/3/2024</a:t>
             </a:fld>
             <a:endParaRPr lang="en-US"/>
           </a:p>
@@ -1497,7 +1496,7 @@
           <a:p>
             <a:fld id="{C1B88465-6FA3-5641-B4BC-B7CE0CCB862B}" type="datetime1">
               <a:rPr lang="en-US" smtClean="0"/>
-              <a:t>10/28/2024</a:t>
+              <a:t>11/3/2024</a:t>
             </a:fld>
             <a:endParaRPr lang="en-US"/>
           </a:p>
@@ -1762,7 +1761,7 @@
           <a:p>
             <a:fld id="{70A03406-48B1-1044-926C-2A42C2AA29D1}" type="datetime1">
               <a:rPr lang="en-US" smtClean="0"/>
-              <a:t>10/28/2024</a:t>
+              <a:t>11/3/2024</a:t>
             </a:fld>
             <a:endParaRPr lang="en-US"/>
           </a:p>
@@ -2174,7 +2173,7 @@
           <a:p>
             <a:fld id="{1E2E4737-E16F-2B44-90FF-1F60D589BAD4}" type="datetime1">
               <a:rPr lang="en-US" smtClean="0"/>
-              <a:t>10/28/2024</a:t>
+              <a:t>11/3/2024</a:t>
             </a:fld>
             <a:endParaRPr lang="en-US"/>
           </a:p>
@@ -2315,7 +2314,7 @@
           <a:p>
             <a:fld id="{66FED64D-6D7C-0644-B0F6-3E84EAB034B8}" type="datetime1">
               <a:rPr lang="en-US" smtClean="0"/>
-              <a:t>10/28/2024</a:t>
+              <a:t>11/3/2024</a:t>
             </a:fld>
             <a:endParaRPr lang="en-US"/>
           </a:p>
@@ -2428,7 +2427,7 @@
           <a:p>
             <a:fld id="{3F5776DA-7DD8-184C-AFC8-EFF50C03D2CE}" type="datetime1">
               <a:rPr lang="en-US" smtClean="0"/>
-              <a:t>10/28/2024</a:t>
+              <a:t>11/3/2024</a:t>
             </a:fld>
             <a:endParaRPr lang="en-US"/>
           </a:p>
@@ -2739,7 +2738,7 @@
           <a:p>
             <a:fld id="{3FEFA4CF-778E-E142-B4B5-332BD2C85D52}" type="datetime1">
               <a:rPr lang="en-US" smtClean="0"/>
-              <a:t>10/28/2024</a:t>
+              <a:t>11/3/2024</a:t>
             </a:fld>
             <a:endParaRPr lang="en-US"/>
           </a:p>
@@ -3027,7 +3026,7 @@
           <a:p>
             <a:fld id="{D7739716-DA30-604F-998E-DF74968F1B70}" type="datetime1">
               <a:rPr lang="en-US" smtClean="0"/>
-              <a:t>10/28/2024</a:t>
+              <a:t>11/3/2024</a:t>
             </a:fld>
             <a:endParaRPr lang="en-US"/>
           </a:p>
@@ -3268,7 +3267,7 @@
           <a:p>
             <a:fld id="{C85AFDDE-DADE-0545-A0FF-5DCC987E6C72}" type="datetime1">
               <a:rPr lang="en-US" smtClean="0"/>
-              <a:t>10/28/2024</a:t>
+              <a:t>11/3/2024</a:t>
             </a:fld>
             <a:endParaRPr lang="en-US"/>
           </a:p>
@@ -3869,15 +3868,39 @@
             <a:p>
               <a:r>
                 <a:rPr lang="en-US" dirty="0"/>
-                <a:t>Vesicle manufacturing must be possible on-site, on-demand, with a suitable </a:t>
+                <a:t>Vesicle manufacturing must be possible </a:t>
               </a:r>
               <a:r>
-                <a:rPr lang="en-US" dirty="0" err="1"/>
+                <a:rPr lang="en-US" b="1" dirty="0"/>
+                <a:t>on-site, on-demand</a:t>
+              </a:r>
+              <a:r>
+                <a:rPr lang="en-US" dirty="0"/>
+                <a:t>, with a </a:t>
+              </a:r>
+              <a:r>
+                <a:rPr lang="en-US" b="1" dirty="0"/>
+                <a:t>suitable </a:t>
+              </a:r>
+              <a:r>
+                <a:rPr lang="en-US" b="1" dirty="0" err="1"/>
                 <a:t>monodispersity</a:t>
               </a:r>
               <a:r>
+                <a:rPr lang="en-US" b="1" dirty="0"/>
+                <a:t> </a:t>
+              </a:r>
+              <a:r>
                 <a:rPr lang="en-US" dirty="0"/>
-                <a:t> in vesicle size, and characterized in minutes. This common task remains challenging for researchers. Solution: build a low-cost, integrated system with computational metrology for non-expert vesicle production.</a:t>
+                <a:t>in vesicle </a:t>
+              </a:r>
+              <a:r>
+                <a:rPr lang="en-US" b="1" dirty="0"/>
+                <a:t>size</a:t>
+              </a:r>
+              <a:r>
+                <a:rPr lang="en-US" dirty="0"/>
+                <a:t>, and characterized in minutes. This common task remains challenging for researchers. Solution: build a low-cost, integrated system with computational metrology for non-expert vesicle production.</a:t>
               </a:r>
             </a:p>
           </p:txBody>
@@ -3912,13 +3935,22 @@
           <a:lstStyle/>
           <a:p>
             <a:r>
+              <a:rPr lang="en-US" b="1" dirty="0">
+                <a:solidFill>
+                  <a:srgbClr val="6796E6"/>
+                </a:solidFill>
+                <a:latin typeface="Consolas" panose="020B0609020204030204" pitchFamily="49" charset="0"/>
+              </a:rPr>
+              <a:t>Deliverables</a:t>
+            </a:r>
+            <a:r>
               <a:rPr lang="en-US" dirty="0">
                 <a:solidFill>
                   <a:srgbClr val="6796E6"/>
                 </a:solidFill>
                 <a:latin typeface="Consolas" panose="020B0609020204030204" pitchFamily="49" charset="0"/>
               </a:rPr>
-              <a:t>Deliverables:</a:t>
+              <a:t>:</a:t>
             </a:r>
           </a:p>
         </p:txBody>
@@ -4030,7 +4062,7 @@
                 <a:effectLst/>
                 <a:latin typeface="Consolas" panose="020B0609020204030204" pitchFamily="49" charset="0"/>
               </a:rPr>
-              <a:t>production of cell-sized (10-50 micron) production of lipid vesicle based synthetic cells. </a:t>
+              <a:t>production of cell-sized (10-50 micron) lipid vesicle based synthetic cells. </a:t>
             </a:r>
             <a:r>
               <a:rPr lang="en-US" b="1" dirty="0">
@@ -4053,7 +4085,7 @@
                 <a:effectLst/>
                 <a:latin typeface="Consolas" panose="020B0609020204030204" pitchFamily="49" charset="0"/>
               </a:rPr>
-              <a:t> A &lt;$10k end-to-end microfluidic chip fabrication system which can reproducibly manufacture devices without expert users.</a:t>
+              <a:t> We will create a &lt;$10k end-to-end microfluidic chip fabrication system which can reproducibly manufacture devices without expert users.</a:t>
             </a:r>
           </a:p>
           <a:p>
@@ -5535,7 +5567,7 @@
           <a:lstStyle/>
           <a:p>
             <a:r>
-              <a:rPr lang="en-US" dirty="0">
+              <a:rPr lang="en-US" b="1" dirty="0">
                 <a:solidFill>
                   <a:schemeClr val="tx2">
                     <a:lumMod val="50000"/>
@@ -6571,58 +6603,468 @@
       </p:grpSpPr>
       <p:sp>
         <p:nvSpPr>
-          <p:cNvPr id="2" name="Title 1">
-            <a:extLst>
-              <a:ext uri="{FF2B5EF4-FFF2-40B4-BE49-F238E27FC236}">
-                <a16:creationId xmlns:a16="http://schemas.microsoft.com/office/drawing/2014/main" id="{5DF1F442-CB2E-925A-ED4D-D675B6517061}"/>
-              </a:ext>
-            </a:extLst>
-          </p:cNvPr>
-          <p:cNvSpPr>
-            <a:spLocks noGrp="1"/>
-          </p:cNvSpPr>
-          <p:nvPr>
-            <p:ph type="title"/>
-          </p:nvPr>
-        </p:nvSpPr>
-        <p:spPr/>
-        <p:txBody>
-          <a:bodyPr/>
-          <a:lstStyle/>
-          <a:p>
-            <a:endParaRPr lang="en-US"/>
-          </a:p>
-        </p:txBody>
-      </p:sp>
-      <p:sp>
-        <p:nvSpPr>
-          <p:cNvPr id="3" name="Content Placeholder 2">
-            <a:extLst>
-              <a:ext uri="{FF2B5EF4-FFF2-40B4-BE49-F238E27FC236}">
-                <a16:creationId xmlns:a16="http://schemas.microsoft.com/office/drawing/2014/main" id="{7BAB54ED-348E-D1AE-2994-18B2D5F9ED28}"/>
-              </a:ext>
-            </a:extLst>
-          </p:cNvPr>
-          <p:cNvSpPr>
-            <a:spLocks noGrp="1"/>
-          </p:cNvSpPr>
-          <p:nvPr>
-            <p:ph idx="1"/>
-          </p:nvPr>
-        </p:nvSpPr>
-        <p:spPr/>
-        <p:txBody>
-          <a:bodyPr/>
-          <a:lstStyle/>
-          <a:p>
-            <a:endParaRPr lang="en-US"/>
+          <p:cNvPr id="5" name="TextBox 4">
+            <a:extLst>
+              <a:ext uri="{FF2B5EF4-FFF2-40B4-BE49-F238E27FC236}">
+                <a16:creationId xmlns:a16="http://schemas.microsoft.com/office/drawing/2014/main" id="{86B35B2E-6863-D82B-ED47-FA89E0F8F769}"/>
+              </a:ext>
+            </a:extLst>
+          </p:cNvPr>
+          <p:cNvSpPr txBox="1"/>
+          <p:nvPr/>
+        </p:nvSpPr>
+        <p:spPr>
+          <a:xfrm>
+            <a:off x="214489" y="248356"/>
+            <a:ext cx="10129696" cy="584775"/>
+          </a:xfrm>
+          <a:prstGeom prst="rect">
+            <a:avLst/>
+          </a:prstGeom>
+          <a:noFill/>
+        </p:spPr>
+        <p:txBody>
+          <a:bodyPr wrap="none" rtlCol="0">
+            <a:spAutoFit/>
+          </a:bodyPr>
+          <a:lstStyle/>
+          <a:p>
+            <a:r>
+              <a:rPr lang="en-GB" sz="3200" b="1" dirty="0">
+                <a:solidFill>
+                  <a:schemeClr val="tx2">
+                    <a:lumMod val="50000"/>
+                    <a:lumOff val="50000"/>
+                  </a:schemeClr>
+                </a:solidFill>
+                <a:latin typeface="Consolas" panose="020B0609020204030204" pitchFamily="49" charset="0"/>
+              </a:rPr>
+              <a:t>WP2: </a:t>
+            </a:r>
+            <a:r>
+              <a:rPr lang="en-GB" sz="3200" dirty="0">
+                <a:solidFill>
+                  <a:schemeClr val="tx2">
+                    <a:lumMod val="50000"/>
+                    <a:lumOff val="50000"/>
+                  </a:schemeClr>
+                </a:solidFill>
+                <a:latin typeface="Consolas" panose="020B0609020204030204" pitchFamily="49" charset="0"/>
+              </a:rPr>
+              <a:t>A</a:t>
+            </a:r>
+            <a:r>
+              <a:rPr lang="en-US" sz="3200" dirty="0" err="1">
+                <a:solidFill>
+                  <a:schemeClr val="tx2">
+                    <a:lumMod val="50000"/>
+                    <a:lumOff val="50000"/>
+                  </a:schemeClr>
+                </a:solidFill>
+                <a:latin typeface="Consolas" panose="020B0609020204030204" pitchFamily="49" charset="0"/>
+              </a:rPr>
+              <a:t>utomation</a:t>
+            </a:r>
+            <a:r>
+              <a:rPr lang="en-US" sz="3200" dirty="0">
+                <a:solidFill>
+                  <a:schemeClr val="tx2">
+                    <a:lumMod val="50000"/>
+                    <a:lumOff val="50000"/>
+                  </a:schemeClr>
+                </a:solidFill>
+                <a:latin typeface="Consolas" panose="020B0609020204030204" pitchFamily="49" charset="0"/>
+              </a:rPr>
+              <a:t> of Synthetic Cell production</a:t>
+            </a:r>
+          </a:p>
+        </p:txBody>
+      </p:sp>
+      <p:sp>
+        <p:nvSpPr>
+          <p:cNvPr id="3" name="TextBox 2">
+            <a:extLst>
+              <a:ext uri="{FF2B5EF4-FFF2-40B4-BE49-F238E27FC236}">
+                <a16:creationId xmlns:a16="http://schemas.microsoft.com/office/drawing/2014/main" id="{E4C25043-9032-DB81-C793-C6DC58F3EE9C}"/>
+              </a:ext>
+            </a:extLst>
+          </p:cNvPr>
+          <p:cNvSpPr txBox="1"/>
+          <p:nvPr/>
+        </p:nvSpPr>
+        <p:spPr>
+          <a:xfrm>
+            <a:off x="242193" y="2164978"/>
+            <a:ext cx="11492089" cy="2308324"/>
+          </a:xfrm>
+          <a:prstGeom prst="rect">
+            <a:avLst/>
+          </a:prstGeom>
+          <a:noFill/>
+        </p:spPr>
+        <p:txBody>
+          <a:bodyPr wrap="square" rtlCol="0">
+            <a:spAutoFit/>
+          </a:bodyPr>
+          <a:lstStyle/>
+          <a:p>
+            <a:r>
+              <a:rPr lang="en-US" b="1" dirty="0">
+                <a:solidFill>
+                  <a:schemeClr val="tx2">
+                    <a:lumMod val="50000"/>
+                    <a:lumOff val="50000"/>
+                  </a:schemeClr>
+                </a:solidFill>
+                <a:latin typeface="Consolas" panose="020B0609020204030204" pitchFamily="49" charset="0"/>
+              </a:rPr>
+              <a:t>Minimum deliverable: </a:t>
+            </a:r>
+          </a:p>
+          <a:p>
+            <a:pPr marL="285750" indent="-285750">
+              <a:buFont typeface="Arial" panose="020B0604020202020204" pitchFamily="34" charset="0"/>
+              <a:buChar char="•"/>
+            </a:pPr>
+            <a:r>
+              <a:rPr lang="en-US" u="sng" dirty="0">
+                <a:solidFill>
+                  <a:schemeClr val="tx2">
+                    <a:lumMod val="50000"/>
+                    <a:lumOff val="50000"/>
+                  </a:schemeClr>
+                </a:solidFill>
+                <a:latin typeface="Consolas" panose="020B0609020204030204" pitchFamily="49" charset="0"/>
+              </a:rPr>
+              <a:t>Monodisperse size. </a:t>
+            </a:r>
+            <a:r>
+              <a:rPr lang="en-US" dirty="0">
+                <a:latin typeface="Consolas" panose="020B0609020204030204" pitchFamily="49" charset="0"/>
+              </a:rPr>
+              <a:t>Demonstrate GUV production using OLA with a normalized standard deviation in </a:t>
+            </a:r>
+            <a:r>
+              <a:rPr lang="en-US" b="1" dirty="0">
+                <a:solidFill>
+                  <a:schemeClr val="tx2">
+                    <a:lumMod val="50000"/>
+                    <a:lumOff val="50000"/>
+                  </a:schemeClr>
+                </a:solidFill>
+                <a:latin typeface="Consolas" panose="020B0609020204030204" pitchFamily="49" charset="0"/>
+              </a:rPr>
+              <a:t>sizes of &lt; 10%.</a:t>
+            </a:r>
+            <a:r>
+              <a:rPr lang="en-US" b="1" u="sng" dirty="0">
+                <a:solidFill>
+                  <a:schemeClr val="tx2">
+                    <a:lumMod val="50000"/>
+                    <a:lumOff val="50000"/>
+                  </a:schemeClr>
+                </a:solidFill>
+                <a:latin typeface="Consolas" panose="020B0609020204030204" pitchFamily="49" charset="0"/>
+              </a:rPr>
+              <a:t> </a:t>
+            </a:r>
+          </a:p>
+          <a:p>
+            <a:pPr marL="285750" indent="-285750">
+              <a:buFont typeface="Arial" panose="020B0604020202020204" pitchFamily="34" charset="0"/>
+              <a:buChar char="•"/>
+            </a:pPr>
+            <a:r>
+              <a:rPr lang="en-US" u="sng" dirty="0">
+                <a:solidFill>
+                  <a:schemeClr val="tx2">
+                    <a:lumMod val="50000"/>
+                    <a:lumOff val="50000"/>
+                  </a:schemeClr>
+                </a:solidFill>
+                <a:latin typeface="Consolas" panose="020B0609020204030204" pitchFamily="49" charset="0"/>
+              </a:rPr>
+              <a:t>Deskilled operation. </a:t>
+            </a:r>
+            <a:r>
+              <a:rPr lang="en-US" dirty="0">
+                <a:latin typeface="Consolas" panose="020B0609020204030204" pitchFamily="49" charset="0"/>
+              </a:rPr>
+              <a:t>Automatic Controller should demonstrate the production of GUVs </a:t>
+            </a:r>
+            <a:r>
+              <a:rPr lang="en-US" b="1" dirty="0">
+                <a:solidFill>
+                  <a:schemeClr val="tx2">
+                    <a:lumMod val="50000"/>
+                    <a:lumOff val="50000"/>
+                  </a:schemeClr>
+                </a:solidFill>
+                <a:latin typeface="Consolas" panose="020B0609020204030204" pitchFamily="49" charset="0"/>
+              </a:rPr>
+              <a:t>without human intervention </a:t>
+            </a:r>
+            <a:r>
+              <a:rPr lang="en-US" dirty="0">
+                <a:latin typeface="Consolas" panose="020B0609020204030204" pitchFamily="49" charset="0"/>
+              </a:rPr>
+              <a:t>from the point of correct fluidic connection of all input fluids.</a:t>
+            </a:r>
+          </a:p>
+          <a:p>
+            <a:endParaRPr lang="en-US" dirty="0">
+              <a:latin typeface="Consolas" panose="020B0609020204030204" pitchFamily="49" charset="0"/>
+            </a:endParaRPr>
+          </a:p>
+          <a:p>
+            <a:pPr lvl="1"/>
+            <a:endParaRPr lang="en-US" dirty="0">
+              <a:latin typeface="Consolas" panose="020B0609020204030204" pitchFamily="49" charset="0"/>
+            </a:endParaRPr>
+          </a:p>
+        </p:txBody>
+      </p:sp>
+      <p:sp>
+        <p:nvSpPr>
+          <p:cNvPr id="4" name="TextBox 3">
+            <a:extLst>
+              <a:ext uri="{FF2B5EF4-FFF2-40B4-BE49-F238E27FC236}">
+                <a16:creationId xmlns:a16="http://schemas.microsoft.com/office/drawing/2014/main" id="{DFEB7C1F-90DF-5236-B94B-3EB16D7EDC46}"/>
+              </a:ext>
+            </a:extLst>
+          </p:cNvPr>
+          <p:cNvSpPr txBox="1"/>
+          <p:nvPr/>
+        </p:nvSpPr>
+        <p:spPr>
+          <a:xfrm>
+            <a:off x="11734282" y="6386945"/>
+            <a:ext cx="457718" cy="369332"/>
+          </a:xfrm>
+          <a:prstGeom prst="rect">
+            <a:avLst/>
+          </a:prstGeom>
+          <a:noFill/>
+        </p:spPr>
+        <p:txBody>
+          <a:bodyPr wrap="square" rtlCol="0">
+            <a:spAutoFit/>
+          </a:bodyPr>
+          <a:lstStyle/>
+          <a:p>
+            <a:fld id="{505A87C2-B971-924F-8687-C15719EACC4F}" type="slidenum">
+              <a:rPr lang="en-US" smtClean="0"/>
+              <a:t>5</a:t>
+            </a:fld>
+            <a:endParaRPr lang="en-US" dirty="0"/>
+          </a:p>
+        </p:txBody>
+      </p:sp>
+      <p:sp>
+        <p:nvSpPr>
+          <p:cNvPr id="6" name="TextBox 5">
+            <a:extLst>
+              <a:ext uri="{FF2B5EF4-FFF2-40B4-BE49-F238E27FC236}">
+                <a16:creationId xmlns:a16="http://schemas.microsoft.com/office/drawing/2014/main" id="{6DA06DD4-A32B-ED09-039A-FD855D58F8BA}"/>
+              </a:ext>
+            </a:extLst>
+          </p:cNvPr>
+          <p:cNvSpPr txBox="1"/>
+          <p:nvPr/>
+        </p:nvSpPr>
+        <p:spPr>
+          <a:xfrm>
+            <a:off x="9153501" y="101723"/>
+            <a:ext cx="2841740" cy="369332"/>
+          </a:xfrm>
+          <a:prstGeom prst="rect">
+            <a:avLst/>
+          </a:prstGeom>
+          <a:noFill/>
+        </p:spPr>
+        <p:txBody>
+          <a:bodyPr wrap="none" rtlCol="0">
+            <a:spAutoFit/>
+          </a:bodyPr>
+          <a:lstStyle/>
+          <a:p>
+            <a:r>
+              <a:rPr lang="en-US" dirty="0" err="1"/>
+              <a:t>m.fletcher@imperial.ac.uk</a:t>
+            </a:r>
+            <a:endParaRPr lang="en-US" dirty="0"/>
+          </a:p>
+        </p:txBody>
+      </p:sp>
+      <p:sp>
+        <p:nvSpPr>
+          <p:cNvPr id="7" name="TextBox 6">
+            <a:extLst>
+              <a:ext uri="{FF2B5EF4-FFF2-40B4-BE49-F238E27FC236}">
+                <a16:creationId xmlns:a16="http://schemas.microsoft.com/office/drawing/2014/main" id="{CC688460-1468-5419-A40C-B7B93D2A97D9}"/>
+              </a:ext>
+            </a:extLst>
+          </p:cNvPr>
+          <p:cNvSpPr txBox="1"/>
+          <p:nvPr/>
+        </p:nvSpPr>
+        <p:spPr>
+          <a:xfrm>
+            <a:off x="-163358" y="1084231"/>
+            <a:ext cx="11492089" cy="923330"/>
+          </a:xfrm>
+          <a:prstGeom prst="rect">
+            <a:avLst/>
+          </a:prstGeom>
+          <a:noFill/>
+        </p:spPr>
+        <p:txBody>
+          <a:bodyPr wrap="square" rtlCol="0">
+            <a:spAutoFit/>
+          </a:bodyPr>
+          <a:lstStyle/>
+          <a:p>
+            <a:pPr lvl="1"/>
+            <a:r>
+              <a:rPr lang="en-GB" b="1" u="sng" dirty="0">
+                <a:solidFill>
+                  <a:schemeClr val="tx2">
+                    <a:lumMod val="50000"/>
+                    <a:lumOff val="50000"/>
+                  </a:schemeClr>
+                </a:solidFill>
+                <a:latin typeface="Consolas" panose="020B0609020204030204" pitchFamily="49" charset="0"/>
+              </a:rPr>
+              <a:t>Aim: </a:t>
+            </a:r>
+            <a:r>
+              <a:rPr lang="en-GB" dirty="0">
+                <a:latin typeface="Consolas" panose="020B0609020204030204" pitchFamily="49" charset="0"/>
+              </a:rPr>
+              <a:t>Demonstrate </a:t>
+            </a:r>
+            <a:r>
+              <a:rPr lang="en-GB" b="1" dirty="0">
+                <a:solidFill>
+                  <a:schemeClr val="tx2">
+                    <a:lumMod val="50000"/>
+                    <a:lumOff val="50000"/>
+                  </a:schemeClr>
+                </a:solidFill>
+                <a:latin typeface="Consolas" panose="020B0609020204030204" pitchFamily="49" charset="0"/>
+              </a:rPr>
+              <a:t>computer controlled </a:t>
+            </a:r>
+            <a:r>
+              <a:rPr lang="en-GB" dirty="0">
+                <a:latin typeface="Consolas" panose="020B0609020204030204" pitchFamily="49" charset="0"/>
+              </a:rPr>
+              <a:t>operation of </a:t>
+            </a:r>
+            <a:r>
+              <a:rPr lang="en-GB" dirty="0">
+                <a:solidFill>
+                  <a:schemeClr val="tx2">
+                    <a:lumMod val="50000"/>
+                    <a:lumOff val="50000"/>
+                  </a:schemeClr>
+                </a:solidFill>
+                <a:latin typeface="Consolas" panose="020B0609020204030204" pitchFamily="49" charset="0"/>
+              </a:rPr>
+              <a:t>microfluidic giant vesicle production</a:t>
+            </a:r>
+            <a:r>
+              <a:rPr lang="en-GB" dirty="0">
+                <a:latin typeface="Consolas" panose="020B0609020204030204" pitchFamily="49" charset="0"/>
+              </a:rPr>
+              <a:t>.</a:t>
+            </a:r>
+          </a:p>
+          <a:p>
+            <a:pPr lvl="1"/>
+            <a:endParaRPr lang="en-GB" u="sng" dirty="0">
+              <a:latin typeface="Consolas" panose="020B0609020204030204" pitchFamily="49" charset="0"/>
+            </a:endParaRPr>
+          </a:p>
+        </p:txBody>
+      </p:sp>
+      <p:sp>
+        <p:nvSpPr>
+          <p:cNvPr id="10" name="TextBox 9">
+            <a:extLst>
+              <a:ext uri="{FF2B5EF4-FFF2-40B4-BE49-F238E27FC236}">
+                <a16:creationId xmlns:a16="http://schemas.microsoft.com/office/drawing/2014/main" id="{DEEE83D4-6F95-CAB7-9B73-54EE4C04DBCA}"/>
+              </a:ext>
+            </a:extLst>
+          </p:cNvPr>
+          <p:cNvSpPr txBox="1"/>
+          <p:nvPr/>
+        </p:nvSpPr>
+        <p:spPr>
+          <a:xfrm>
+            <a:off x="242193" y="4229794"/>
+            <a:ext cx="11492089" cy="1200329"/>
+          </a:xfrm>
+          <a:prstGeom prst="rect">
+            <a:avLst/>
+          </a:prstGeom>
+          <a:noFill/>
+        </p:spPr>
+        <p:txBody>
+          <a:bodyPr wrap="square" rtlCol="0">
+            <a:spAutoFit/>
+          </a:bodyPr>
+          <a:lstStyle/>
+          <a:p>
+            <a:r>
+              <a:rPr lang="en-US" b="1" dirty="0">
+                <a:solidFill>
+                  <a:schemeClr val="tx2">
+                    <a:lumMod val="50000"/>
+                    <a:lumOff val="50000"/>
+                  </a:schemeClr>
+                </a:solidFill>
+                <a:latin typeface="Consolas" panose="020B0609020204030204" pitchFamily="49" charset="0"/>
+              </a:rPr>
+              <a:t>Expected deliverable: </a:t>
+            </a:r>
+          </a:p>
+          <a:p>
+            <a:pPr marL="285750" indent="-285750">
+              <a:buFont typeface="Arial" panose="020B0604020202020204" pitchFamily="34" charset="0"/>
+              <a:buChar char="•"/>
+            </a:pPr>
+            <a:r>
+              <a:rPr lang="en-US" dirty="0">
+                <a:latin typeface="Consolas" panose="020B0609020204030204" pitchFamily="49" charset="0"/>
+              </a:rPr>
+              <a:t>Same as minimum deliverable, but controller footprint is minimized by </a:t>
+            </a:r>
+            <a:r>
+              <a:rPr lang="en-US" dirty="0">
+                <a:solidFill>
+                  <a:schemeClr val="tx2">
+                    <a:lumMod val="50000"/>
+                    <a:lumOff val="50000"/>
+                  </a:schemeClr>
+                </a:solidFill>
+                <a:latin typeface="Consolas" panose="020B0609020204030204" pitchFamily="49" charset="0"/>
+              </a:rPr>
+              <a:t>compatibility with Raspberry Pi</a:t>
+            </a:r>
+          </a:p>
+          <a:p>
+            <a:pPr lvl="1"/>
+            <a:endParaRPr lang="en-US" dirty="0">
+              <a:latin typeface="Consolas" panose="020B0609020204030204" pitchFamily="49" charset="0"/>
+            </a:endParaRPr>
           </a:p>
         </p:txBody>
       </p:sp>
     </p:spTree>
     <p:extLst>
       <p:ext uri="{BB962C8B-B14F-4D97-AF65-F5344CB8AC3E}">
-        <p14:creationId xmlns:p14="http://schemas.microsoft.com/office/powerpoint/2010/main" val="4279609804"/>
+        <p14:creationId xmlns:p14="http://schemas.microsoft.com/office/powerpoint/2010/main" val="2824141430"/>
       </p:ext>
     </p:extLst>
   </p:cSld>
@@ -6654,496 +7096,6 @@
           <p:cNvPr id="5" name="TextBox 4">
             <a:extLst>
               <a:ext uri="{FF2B5EF4-FFF2-40B4-BE49-F238E27FC236}">
-                <a16:creationId xmlns:a16="http://schemas.microsoft.com/office/drawing/2014/main" id="{86B35B2E-6863-D82B-ED47-FA89E0F8F769}"/>
-              </a:ext>
-            </a:extLst>
-          </p:cNvPr>
-          <p:cNvSpPr txBox="1"/>
-          <p:nvPr/>
-        </p:nvSpPr>
-        <p:spPr>
-          <a:xfrm>
-            <a:off x="214489" y="248356"/>
-            <a:ext cx="10129696" cy="584775"/>
-          </a:xfrm>
-          <a:prstGeom prst="rect">
-            <a:avLst/>
-          </a:prstGeom>
-          <a:noFill/>
-        </p:spPr>
-        <p:txBody>
-          <a:bodyPr wrap="none" rtlCol="0">
-            <a:spAutoFit/>
-          </a:bodyPr>
-          <a:lstStyle/>
-          <a:p>
-            <a:r>
-              <a:rPr lang="en-GB" sz="3200" b="1" dirty="0">
-                <a:solidFill>
-                  <a:schemeClr val="tx2">
-                    <a:lumMod val="50000"/>
-                    <a:lumOff val="50000"/>
-                  </a:schemeClr>
-                </a:solidFill>
-                <a:latin typeface="Consolas" panose="020B0609020204030204" pitchFamily="49" charset="0"/>
-              </a:rPr>
-              <a:t>WP2: </a:t>
-            </a:r>
-            <a:r>
-              <a:rPr lang="en-GB" sz="3200" dirty="0">
-                <a:solidFill>
-                  <a:schemeClr val="tx2">
-                    <a:lumMod val="50000"/>
-                    <a:lumOff val="50000"/>
-                  </a:schemeClr>
-                </a:solidFill>
-                <a:latin typeface="Consolas" panose="020B0609020204030204" pitchFamily="49" charset="0"/>
-              </a:rPr>
-              <a:t>A</a:t>
-            </a:r>
-            <a:r>
-              <a:rPr lang="en-US" sz="3200" dirty="0" err="1">
-                <a:solidFill>
-                  <a:schemeClr val="tx2">
-                    <a:lumMod val="50000"/>
-                    <a:lumOff val="50000"/>
-                  </a:schemeClr>
-                </a:solidFill>
-                <a:latin typeface="Consolas" panose="020B0609020204030204" pitchFamily="49" charset="0"/>
-              </a:rPr>
-              <a:t>utomation</a:t>
-            </a:r>
-            <a:r>
-              <a:rPr lang="en-US" sz="3200" dirty="0">
-                <a:solidFill>
-                  <a:schemeClr val="tx2">
-                    <a:lumMod val="50000"/>
-                    <a:lumOff val="50000"/>
-                  </a:schemeClr>
-                </a:solidFill>
-                <a:latin typeface="Consolas" panose="020B0609020204030204" pitchFamily="49" charset="0"/>
-              </a:rPr>
-              <a:t> of Synthetic Cell production</a:t>
-            </a:r>
-          </a:p>
-        </p:txBody>
-      </p:sp>
-      <p:sp>
-        <p:nvSpPr>
-          <p:cNvPr id="3" name="TextBox 2">
-            <a:extLst>
-              <a:ext uri="{FF2B5EF4-FFF2-40B4-BE49-F238E27FC236}">
-                <a16:creationId xmlns:a16="http://schemas.microsoft.com/office/drawing/2014/main" id="{E4C25043-9032-DB81-C793-C6DC58F3EE9C}"/>
-              </a:ext>
-            </a:extLst>
-          </p:cNvPr>
-          <p:cNvSpPr txBox="1"/>
-          <p:nvPr/>
-        </p:nvSpPr>
-        <p:spPr>
-          <a:xfrm>
-            <a:off x="242193" y="2164978"/>
-            <a:ext cx="11492089" cy="2308324"/>
-          </a:xfrm>
-          <a:prstGeom prst="rect">
-            <a:avLst/>
-          </a:prstGeom>
-          <a:noFill/>
-        </p:spPr>
-        <p:txBody>
-          <a:bodyPr wrap="square" rtlCol="0">
-            <a:spAutoFit/>
-          </a:bodyPr>
-          <a:lstStyle/>
-          <a:p>
-            <a:r>
-              <a:rPr lang="en-US" b="1" dirty="0">
-                <a:solidFill>
-                  <a:schemeClr val="tx2">
-                    <a:lumMod val="50000"/>
-                    <a:lumOff val="50000"/>
-                  </a:schemeClr>
-                </a:solidFill>
-                <a:latin typeface="Consolas" panose="020B0609020204030204" pitchFamily="49" charset="0"/>
-              </a:rPr>
-              <a:t>Minimum deliverable: </a:t>
-            </a:r>
-          </a:p>
-          <a:p>
-            <a:pPr marL="285750" indent="-285750">
-              <a:buFont typeface="Arial" panose="020B0604020202020204" pitchFamily="34" charset="0"/>
-              <a:buChar char="•"/>
-            </a:pPr>
-            <a:r>
-              <a:rPr lang="en-US" u="sng" dirty="0">
-                <a:solidFill>
-                  <a:schemeClr val="tx2">
-                    <a:lumMod val="50000"/>
-                    <a:lumOff val="50000"/>
-                  </a:schemeClr>
-                </a:solidFill>
-                <a:latin typeface="Consolas" panose="020B0609020204030204" pitchFamily="49" charset="0"/>
-              </a:rPr>
-              <a:t>Monodisperse size. </a:t>
-            </a:r>
-            <a:r>
-              <a:rPr lang="en-US" dirty="0">
-                <a:latin typeface="Consolas" panose="020B0609020204030204" pitchFamily="49" charset="0"/>
-              </a:rPr>
-              <a:t>Demonstrate GUV production using OLA with a normalized standard deviation in </a:t>
-            </a:r>
-            <a:r>
-              <a:rPr lang="en-US" b="1" dirty="0">
-                <a:solidFill>
-                  <a:schemeClr val="tx2">
-                    <a:lumMod val="50000"/>
-                    <a:lumOff val="50000"/>
-                  </a:schemeClr>
-                </a:solidFill>
-                <a:latin typeface="Consolas" panose="020B0609020204030204" pitchFamily="49" charset="0"/>
-              </a:rPr>
-              <a:t>sizes of &lt; 10%.</a:t>
-            </a:r>
-            <a:r>
-              <a:rPr lang="en-US" b="1" u="sng" dirty="0">
-                <a:solidFill>
-                  <a:schemeClr val="tx2">
-                    <a:lumMod val="50000"/>
-                    <a:lumOff val="50000"/>
-                  </a:schemeClr>
-                </a:solidFill>
-                <a:latin typeface="Consolas" panose="020B0609020204030204" pitchFamily="49" charset="0"/>
-              </a:rPr>
-              <a:t> </a:t>
-            </a:r>
-          </a:p>
-          <a:p>
-            <a:pPr marL="285750" indent="-285750">
-              <a:buFont typeface="Arial" panose="020B0604020202020204" pitchFamily="34" charset="0"/>
-              <a:buChar char="•"/>
-            </a:pPr>
-            <a:r>
-              <a:rPr lang="en-US" u="sng" dirty="0">
-                <a:solidFill>
-                  <a:schemeClr val="tx2">
-                    <a:lumMod val="50000"/>
-                    <a:lumOff val="50000"/>
-                  </a:schemeClr>
-                </a:solidFill>
-                <a:latin typeface="Consolas" panose="020B0609020204030204" pitchFamily="49" charset="0"/>
-              </a:rPr>
-              <a:t>Deskilled operation. </a:t>
-            </a:r>
-            <a:r>
-              <a:rPr lang="en-US" dirty="0">
-                <a:latin typeface="Consolas" panose="020B0609020204030204" pitchFamily="49" charset="0"/>
-              </a:rPr>
-              <a:t>Automatic Controller should demonstrate the production of GUVs </a:t>
-            </a:r>
-            <a:r>
-              <a:rPr lang="en-US" b="1" dirty="0">
-                <a:solidFill>
-                  <a:schemeClr val="tx2">
-                    <a:lumMod val="50000"/>
-                    <a:lumOff val="50000"/>
-                  </a:schemeClr>
-                </a:solidFill>
-                <a:latin typeface="Consolas" panose="020B0609020204030204" pitchFamily="49" charset="0"/>
-              </a:rPr>
-              <a:t>without human intervention </a:t>
-            </a:r>
-            <a:r>
-              <a:rPr lang="en-US" dirty="0">
-                <a:latin typeface="Consolas" panose="020B0609020204030204" pitchFamily="49" charset="0"/>
-              </a:rPr>
-              <a:t>from the point of correct fluidic connection of all input fluids.</a:t>
-            </a:r>
-          </a:p>
-          <a:p>
-            <a:endParaRPr lang="en-US" dirty="0">
-              <a:latin typeface="Consolas" panose="020B0609020204030204" pitchFamily="49" charset="0"/>
-            </a:endParaRPr>
-          </a:p>
-          <a:p>
-            <a:pPr lvl="1"/>
-            <a:endParaRPr lang="en-US" dirty="0">
-              <a:latin typeface="Consolas" panose="020B0609020204030204" pitchFamily="49" charset="0"/>
-            </a:endParaRPr>
-          </a:p>
-        </p:txBody>
-      </p:sp>
-      <p:sp>
-        <p:nvSpPr>
-          <p:cNvPr id="4" name="TextBox 3">
-            <a:extLst>
-              <a:ext uri="{FF2B5EF4-FFF2-40B4-BE49-F238E27FC236}">
-                <a16:creationId xmlns:a16="http://schemas.microsoft.com/office/drawing/2014/main" id="{DFEB7C1F-90DF-5236-B94B-3EB16D7EDC46}"/>
-              </a:ext>
-            </a:extLst>
-          </p:cNvPr>
-          <p:cNvSpPr txBox="1"/>
-          <p:nvPr/>
-        </p:nvSpPr>
-        <p:spPr>
-          <a:xfrm>
-            <a:off x="11734282" y="6386945"/>
-            <a:ext cx="457718" cy="369332"/>
-          </a:xfrm>
-          <a:prstGeom prst="rect">
-            <a:avLst/>
-          </a:prstGeom>
-          <a:noFill/>
-        </p:spPr>
-        <p:txBody>
-          <a:bodyPr wrap="square" rtlCol="0">
-            <a:spAutoFit/>
-          </a:bodyPr>
-          <a:lstStyle/>
-          <a:p>
-            <a:fld id="{505A87C2-B971-924F-8687-C15719EACC4F}" type="slidenum">
-              <a:rPr lang="en-US" smtClean="0"/>
-              <a:t>6</a:t>
-            </a:fld>
-            <a:endParaRPr lang="en-US" dirty="0"/>
-          </a:p>
-        </p:txBody>
-      </p:sp>
-      <p:sp>
-        <p:nvSpPr>
-          <p:cNvPr id="6" name="TextBox 5">
-            <a:extLst>
-              <a:ext uri="{FF2B5EF4-FFF2-40B4-BE49-F238E27FC236}">
-                <a16:creationId xmlns:a16="http://schemas.microsoft.com/office/drawing/2014/main" id="{6DA06DD4-A32B-ED09-039A-FD855D58F8BA}"/>
-              </a:ext>
-            </a:extLst>
-          </p:cNvPr>
-          <p:cNvSpPr txBox="1"/>
-          <p:nvPr/>
-        </p:nvSpPr>
-        <p:spPr>
-          <a:xfrm>
-            <a:off x="9153501" y="101723"/>
-            <a:ext cx="2841740" cy="369332"/>
-          </a:xfrm>
-          <a:prstGeom prst="rect">
-            <a:avLst/>
-          </a:prstGeom>
-          <a:noFill/>
-        </p:spPr>
-        <p:txBody>
-          <a:bodyPr wrap="none" rtlCol="0">
-            <a:spAutoFit/>
-          </a:bodyPr>
-          <a:lstStyle/>
-          <a:p>
-            <a:r>
-              <a:rPr lang="en-US" dirty="0" err="1"/>
-              <a:t>m.fletcher@imperial.ac.uk</a:t>
-            </a:r>
-            <a:endParaRPr lang="en-US" dirty="0"/>
-          </a:p>
-        </p:txBody>
-      </p:sp>
-      <p:sp>
-        <p:nvSpPr>
-          <p:cNvPr id="7" name="TextBox 6">
-            <a:extLst>
-              <a:ext uri="{FF2B5EF4-FFF2-40B4-BE49-F238E27FC236}">
-                <a16:creationId xmlns:a16="http://schemas.microsoft.com/office/drawing/2014/main" id="{CC688460-1468-5419-A40C-B7B93D2A97D9}"/>
-              </a:ext>
-            </a:extLst>
-          </p:cNvPr>
-          <p:cNvSpPr txBox="1"/>
-          <p:nvPr/>
-        </p:nvSpPr>
-        <p:spPr>
-          <a:xfrm>
-            <a:off x="-163358" y="1084231"/>
-            <a:ext cx="11492089" cy="923330"/>
-          </a:xfrm>
-          <a:prstGeom prst="rect">
-            <a:avLst/>
-          </a:prstGeom>
-          <a:noFill/>
-        </p:spPr>
-        <p:txBody>
-          <a:bodyPr wrap="square" rtlCol="0">
-            <a:spAutoFit/>
-          </a:bodyPr>
-          <a:lstStyle/>
-          <a:p>
-            <a:pPr lvl="1"/>
-            <a:r>
-              <a:rPr lang="en-GB" b="1" u="sng" dirty="0">
-                <a:solidFill>
-                  <a:schemeClr val="tx2">
-                    <a:lumMod val="50000"/>
-                    <a:lumOff val="50000"/>
-                  </a:schemeClr>
-                </a:solidFill>
-                <a:latin typeface="Consolas" panose="020B0609020204030204" pitchFamily="49" charset="0"/>
-              </a:rPr>
-              <a:t>Aim: </a:t>
-            </a:r>
-            <a:r>
-              <a:rPr lang="en-GB" dirty="0">
-                <a:latin typeface="Consolas" panose="020B0609020204030204" pitchFamily="49" charset="0"/>
-              </a:rPr>
-              <a:t>Demonstrate </a:t>
-            </a:r>
-            <a:r>
-              <a:rPr lang="en-GB" b="1" dirty="0">
-                <a:solidFill>
-                  <a:schemeClr val="tx2">
-                    <a:lumMod val="50000"/>
-                    <a:lumOff val="50000"/>
-                  </a:schemeClr>
-                </a:solidFill>
-                <a:latin typeface="Consolas" panose="020B0609020204030204" pitchFamily="49" charset="0"/>
-              </a:rPr>
-              <a:t>computer controlled </a:t>
-            </a:r>
-            <a:r>
-              <a:rPr lang="en-GB" dirty="0">
-                <a:latin typeface="Consolas" panose="020B0609020204030204" pitchFamily="49" charset="0"/>
-              </a:rPr>
-              <a:t>operation of </a:t>
-            </a:r>
-            <a:r>
-              <a:rPr lang="en-GB" dirty="0">
-                <a:solidFill>
-                  <a:schemeClr val="tx2">
-                    <a:lumMod val="50000"/>
-                    <a:lumOff val="50000"/>
-                  </a:schemeClr>
-                </a:solidFill>
-                <a:latin typeface="Consolas" panose="020B0609020204030204" pitchFamily="49" charset="0"/>
-              </a:rPr>
-              <a:t>microfluidic giant vesicle production</a:t>
-            </a:r>
-            <a:r>
-              <a:rPr lang="en-GB" dirty="0">
-                <a:latin typeface="Consolas" panose="020B0609020204030204" pitchFamily="49" charset="0"/>
-              </a:rPr>
-              <a:t>.</a:t>
-            </a:r>
-          </a:p>
-          <a:p>
-            <a:pPr lvl="1"/>
-            <a:endParaRPr lang="en-GB" u="sng" dirty="0">
-              <a:latin typeface="Consolas" panose="020B0609020204030204" pitchFamily="49" charset="0"/>
-            </a:endParaRPr>
-          </a:p>
-        </p:txBody>
-      </p:sp>
-      <p:sp>
-        <p:nvSpPr>
-          <p:cNvPr id="10" name="TextBox 9">
-            <a:extLst>
-              <a:ext uri="{FF2B5EF4-FFF2-40B4-BE49-F238E27FC236}">
-                <a16:creationId xmlns:a16="http://schemas.microsoft.com/office/drawing/2014/main" id="{DEEE83D4-6F95-CAB7-9B73-54EE4C04DBCA}"/>
-              </a:ext>
-            </a:extLst>
-          </p:cNvPr>
-          <p:cNvSpPr txBox="1"/>
-          <p:nvPr/>
-        </p:nvSpPr>
-        <p:spPr>
-          <a:xfrm>
-            <a:off x="242193" y="4229794"/>
-            <a:ext cx="11492089" cy="1200329"/>
-          </a:xfrm>
-          <a:prstGeom prst="rect">
-            <a:avLst/>
-          </a:prstGeom>
-          <a:noFill/>
-        </p:spPr>
-        <p:txBody>
-          <a:bodyPr wrap="square" rtlCol="0">
-            <a:spAutoFit/>
-          </a:bodyPr>
-          <a:lstStyle/>
-          <a:p>
-            <a:r>
-              <a:rPr lang="en-US" b="1" dirty="0">
-                <a:solidFill>
-                  <a:schemeClr val="tx2">
-                    <a:lumMod val="50000"/>
-                    <a:lumOff val="50000"/>
-                  </a:schemeClr>
-                </a:solidFill>
-                <a:latin typeface="Consolas" panose="020B0609020204030204" pitchFamily="49" charset="0"/>
-              </a:rPr>
-              <a:t>Expected deliverable: </a:t>
-            </a:r>
-          </a:p>
-          <a:p>
-            <a:pPr marL="285750" indent="-285750">
-              <a:buFont typeface="Arial" panose="020B0604020202020204" pitchFamily="34" charset="0"/>
-              <a:buChar char="•"/>
-            </a:pPr>
-            <a:r>
-              <a:rPr lang="en-US" dirty="0">
-                <a:latin typeface="Consolas" panose="020B0609020204030204" pitchFamily="49" charset="0"/>
-              </a:rPr>
-              <a:t>Same as minimum deliverable, but controller footprint is minimized by </a:t>
-            </a:r>
-            <a:r>
-              <a:rPr lang="en-US" dirty="0">
-                <a:solidFill>
-                  <a:schemeClr val="tx2">
-                    <a:lumMod val="50000"/>
-                    <a:lumOff val="50000"/>
-                  </a:schemeClr>
-                </a:solidFill>
-                <a:latin typeface="Consolas" panose="020B0609020204030204" pitchFamily="49" charset="0"/>
-              </a:rPr>
-              <a:t>compatibility with Raspberry Pi</a:t>
-            </a:r>
-          </a:p>
-          <a:p>
-            <a:pPr lvl="1"/>
-            <a:endParaRPr lang="en-US" dirty="0">
-              <a:latin typeface="Consolas" panose="020B0609020204030204" pitchFamily="49" charset="0"/>
-            </a:endParaRPr>
-          </a:p>
-        </p:txBody>
-      </p:sp>
-    </p:spTree>
-    <p:extLst>
-      <p:ext uri="{BB962C8B-B14F-4D97-AF65-F5344CB8AC3E}">
-        <p14:creationId xmlns:p14="http://schemas.microsoft.com/office/powerpoint/2010/main" val="2824141430"/>
-      </p:ext>
-    </p:extLst>
-  </p:cSld>
-  <p:clrMapOvr>
-    <a:masterClrMapping/>
-  </p:clrMapOvr>
-</p:sld>
-</file>
-
-<file path=ppt/slides/slide7.xml><?xml version="1.0" encoding="utf-8"?>
-<p:sld xmlns:a="http://schemas.openxmlformats.org/drawingml/2006/main" xmlns:r="http://schemas.openxmlformats.org/officeDocument/2006/relationships" xmlns:p="http://schemas.openxmlformats.org/presentationml/2006/main">
-  <p:cSld>
-    <p:spTree>
-      <p:nvGrpSpPr>
-        <p:cNvPr id="1" name=""/>
-        <p:cNvGrpSpPr/>
-        <p:nvPr/>
-      </p:nvGrpSpPr>
-      <p:grpSpPr>
-        <a:xfrm>
-          <a:off x="0" y="0"/>
-          <a:ext cx="0" cy="0"/>
-          <a:chOff x="0" y="0"/>
-          <a:chExt cx="0" cy="0"/>
-        </a:xfrm>
-      </p:grpSpPr>
-      <p:sp>
-        <p:nvSpPr>
-          <p:cNvPr id="5" name="TextBox 4">
-            <a:extLst>
-              <a:ext uri="{FF2B5EF4-FFF2-40B4-BE49-F238E27FC236}">
                 <a16:creationId xmlns:a16="http://schemas.microsoft.com/office/drawing/2014/main" id="{D7F6F33E-A062-EDAF-D6CE-F248C286CBAA}"/>
               </a:ext>
             </a:extLst>
@@ -7591,7 +7543,7 @@
 </p:sld>
 </file>
 
-<file path=ppt/slides/slide8.xml><?xml version="1.0" encoding="utf-8"?>
+<file path=ppt/slides/slide7.xml><?xml version="1.0" encoding="utf-8"?>
 <p:sld xmlns:a="http://schemas.openxmlformats.org/drawingml/2006/main" xmlns:r="http://schemas.openxmlformats.org/officeDocument/2006/relationships" xmlns:p="http://schemas.openxmlformats.org/presentationml/2006/main">
   <p:cSld>
     <p:spTree>

</xml_diff>